<commit_message>
resized image of queue animation
</commit_message>
<xml_diff>
--- a/docs/images/image_sources/queueanimation.pptx
+++ b/docs/images/image_sources/queueanimation.pptx
@@ -25596,7 +25596,7 @@
             <a:pPr lvl="1"/>
             <a:r>
               <a:rPr lang="en-US" sz="1400" dirty="0"/>
-              <a:t>not enough time before job 4</a:t>
+              <a:t>insufficient time before 4</a:t>
             </a:r>
           </a:p>
           <a:p>
@@ -30849,7 +30849,7 @@
             <a:pPr lvl="1"/>
             <a:r>
               <a:rPr lang="en-US" sz="1400" dirty="0"/>
-              <a:t>not enough time before job 4</a:t>
+              <a:t>insufficient time before 4</a:t>
             </a:r>
           </a:p>
           <a:p>
@@ -36195,8 +36195,12 @@
           <a:p>
             <a:pPr lvl="1"/>
             <a:r>
+              <a:rPr lang="en-US" sz="1400"/>
+              <a:t>insufficient time before </a:t>
+            </a:r>
+            <a:r>
               <a:rPr lang="en-US" sz="1400" dirty="0"/>
-              <a:t>not enough time before job 4</a:t>
+              <a:t>4</a:t>
             </a:r>
           </a:p>
           <a:p>

</xml_diff>

<commit_message>
Added description of queue animation
</commit_message>
<xml_diff>
--- a/docs/images/image_sources/queueanimation.pptx
+++ b/docs/images/image_sources/queueanimation.pptx
@@ -36195,12 +36195,8 @@
           <a:p>
             <a:pPr lvl="1"/>
             <a:r>
-              <a:rPr lang="en-US" sz="1400"/>
-              <a:t>insufficient time before </a:t>
-            </a:r>
-            <a:r>
               <a:rPr lang="en-US" sz="1400" dirty="0"/>
-              <a:t>4</a:t>
+              <a:t>insufficient time before 4</a:t>
             </a:r>
           </a:p>
           <a:p>

</xml_diff>

<commit_message>
Update to queueanimation gif
</commit_message>
<xml_diff>
--- a/docs/images/image_sources/queueanimation.pptx
+++ b/docs/images/image_sources/queueanimation.pptx
@@ -449,7 +449,7 @@
             <a:fld id="{AF53FA3B-A911-4294-9666-9D8A5388C07E}" type="datetimeFigureOut">
               <a:rPr lang="sv-SE" smtClean="0"/>
               <a:pPr/>
-              <a:t>2025-10-31</a:t>
+              <a:t>2025-11-03</a:t>
             </a:fld>
             <a:endParaRPr lang="sv-SE"/>
           </a:p>
@@ -616,7 +616,7 @@
             <a:fld id="{DAAF5E47-94AA-AA43-B08E-C5A5421011EB}" type="datetimeFigureOut">
               <a:rPr lang="sv-SE" smtClean="0"/>
               <a:pPr/>
-              <a:t>2025-10-31</a:t>
+              <a:t>2025-11-03</a:t>
             </a:fld>
             <a:endParaRPr lang="sv-SE"/>
           </a:p>
@@ -25630,7 +25630,7 @@
             <a:pPr lvl="1"/>
             <a:r>
               <a:rPr lang="en-US" sz="1400" dirty="0"/>
-              <a:t>run after 1, before 4 &amp; 5</a:t>
+              <a:t>run 6 after 1, before 4 &amp; 5</a:t>
             </a:r>
           </a:p>
         </p:txBody>
@@ -30883,7 +30883,7 @@
             <a:pPr lvl="1"/>
             <a:r>
               <a:rPr lang="en-US" sz="1400" dirty="0"/>
-              <a:t>run after 1, before 4 &amp; 5</a:t>
+              <a:t>run 6 after 1, before 4 &amp; 5</a:t>
             </a:r>
           </a:p>
           <a:p>
@@ -30896,8 +30896,13 @@
             <a:pPr lvl="1"/>
             <a:r>
               <a:rPr lang="en-US" sz="1400" dirty="0"/>
-              <a:t>run later</a:t>
+              <a:t>run </a:t>
             </a:r>
+            <a:r>
+              <a:rPr lang="en-US" sz="1400"/>
+              <a:t>later after 6 &amp; 4</a:t>
+            </a:r>
+            <a:endParaRPr lang="en-US" sz="1400" dirty="0"/>
           </a:p>
         </p:txBody>
       </p:sp>
@@ -36230,7 +36235,7 @@
             <a:pPr lvl="1"/>
             <a:r>
               <a:rPr lang="en-US" sz="1400" dirty="0"/>
-              <a:t>run after 1, before 4 &amp; 5</a:t>
+              <a:t>run 6 after 1, before 4 &amp; 5</a:t>
             </a:r>
           </a:p>
           <a:p>
@@ -36243,7 +36248,7 @@
             <a:pPr lvl="1"/>
             <a:r>
               <a:rPr lang="en-US" sz="1400" dirty="0"/>
-              <a:t>run later</a:t>
+              <a:t>run later after 6 and 4</a:t>
             </a:r>
           </a:p>
           <a:p>
@@ -36256,7 +36261,7 @@
             <a:pPr lvl="1"/>
             <a:r>
               <a:rPr lang="en-US" sz="1400" dirty="0"/>
-              <a:t>runs directly</a:t>
+              <a:t>runs directly on node 1</a:t>
             </a:r>
           </a:p>
         </p:txBody>
@@ -43117,15 +43122,6 @@
 </file>
 
 <file path=customXml/item1.xml><?xml version="1.0" encoding="utf-8"?>
-<?mso-contentType ?>
-<FormTemplates xmlns="http://schemas.microsoft.com/sharepoint/v3/contenttype/forms">
-  <Display>DocumentLibraryForm</Display>
-  <Edit>DocumentLibraryForm</Edit>
-  <New>DocumentLibraryForm</New>
-</FormTemplates>
-</file>
-
-<file path=customXml/item2.xml><?xml version="1.0" encoding="utf-8"?>
 <ct:contentTypeSchema xmlns:ct="http://schemas.microsoft.com/office/2006/metadata/contentType" xmlns:ma="http://schemas.microsoft.com/office/2006/metadata/properties/metaAttributes" ct:_="" ma:_="" ma:contentTypeName="Document" ma:contentTypeID="0x01010097D8F1169E1C724EB589611C00182679" ma:contentTypeVersion="17" ma:contentTypeDescription="Create a new document." ma:contentTypeScope="" ma:versionID="f8e38a9c45a265d91e432fbaab83eb55">
   <xsd:schema xmlns:xsd="http://www.w3.org/2001/XMLSchema" xmlns:xs="http://www.w3.org/2001/XMLSchema" xmlns:p="http://schemas.microsoft.com/office/2006/metadata/properties" xmlns:ns2="db239f85-afbf-4fe0-8766-fdeec8c4c598" xmlns:ns3="7c35e954-b1c4-48f1-9d44-b4d8096cc301" targetNamespace="http://schemas.microsoft.com/office/2006/metadata/properties" ma:root="true" ma:fieldsID="3436024126d0297fdaecfc68ae27bd9a" ns2:_="" ns3:_="">
     <xsd:import namespace="db239f85-afbf-4fe0-8766-fdeec8c4c598"/>
@@ -43368,6 +43364,15 @@
 </ct:contentTypeSchema>
 </file>
 
+<file path=customXml/item2.xml><?xml version="1.0" encoding="utf-8"?>
+<?mso-contentType ?>
+<FormTemplates xmlns="http://schemas.microsoft.com/sharepoint/v3/contenttype/forms">
+  <Display>DocumentLibraryForm</Display>
+  <Edit>DocumentLibraryForm</Edit>
+  <New>DocumentLibraryForm</New>
+</FormTemplates>
+</file>
+
 <file path=customXml/item3.xml><?xml version="1.0" encoding="utf-8"?>
 <p:properties xmlns:p="http://schemas.microsoft.com/office/2006/metadata/properties" xmlns:xsi="http://www.w3.org/2001/XMLSchema-instance" xmlns:pc="http://schemas.microsoft.com/office/infopath/2007/PartnerControls">
   <documentManagement>
@@ -43380,14 +43385,6 @@
 </file>
 
 <file path=customXml/itemProps1.xml><?xml version="1.0" encoding="utf-8"?>
-<ds:datastoreItem xmlns:ds="http://schemas.openxmlformats.org/officeDocument/2006/customXml" ds:itemID="{3C56F0E7-FFD0-4AE7-B357-D88DAE189F5E}">
-  <ds:schemaRefs>
-    <ds:schemaRef ds:uri="http://schemas.microsoft.com/sharepoint/v3/contenttype/forms"/>
-  </ds:schemaRefs>
-</ds:datastoreItem>
-</file>
-
-<file path=customXml/itemProps2.xml><?xml version="1.0" encoding="utf-8"?>
 <ds:datastoreItem xmlns:ds="http://schemas.openxmlformats.org/officeDocument/2006/customXml" ds:itemID="{4A09B9E3-9F41-4161-B2DC-AAD059F5DA32}">
   <ds:schemaRefs>
     <ds:schemaRef ds:uri="7c35e954-b1c4-48f1-9d44-b4d8096cc301"/>
@@ -43402,6 +43399,14 @@
     <ds:schemaRef ds:uri="http://schemas.microsoft.com/office/infopath/2007/PartnerControls"/>
     <ds:schemaRef ds:uri="http://schemas.openxmlformats.org/package/2006/metadata/core-properties"/>
     <ds:schemaRef ds:uri="http://www.w3.org/2001/XMLSchema"/>
+  </ds:schemaRefs>
+</ds:datastoreItem>
+</file>
+
+<file path=customXml/itemProps2.xml><?xml version="1.0" encoding="utf-8"?>
+<ds:datastoreItem xmlns:ds="http://schemas.openxmlformats.org/officeDocument/2006/customXml" ds:itemID="{3C56F0E7-FFD0-4AE7-B357-D88DAE189F5E}">
+  <ds:schemaRefs>
+    <ds:schemaRef ds:uri="http://schemas.microsoft.com/sharepoint/v3/contenttype/forms"/>
   </ds:schemaRefs>
 </ds:datastoreItem>
 </file>

</xml_diff>